<commit_message>
update classes diagrams (#1297)
</commit_message>
<xml_diff>
--- a/docs/specutils_classes_diagrams.pptx
+++ b/docs/specutils_classes_diagrams.pptx
@@ -259,7 +259,7 @@
           <a:p>
             <a:fld id="{D28EE5FE-4A4D-DF46-9D59-49482504BE25}" type="datetimeFigureOut">
               <a:rPr lang="en-US" smtClean="0"/>
-              <a:t>9/18/18</a:t>
+              <a:t>1/2/26</a:t>
             </a:fld>
             <a:endParaRPr lang="en-US"/>
           </a:p>
@@ -457,7 +457,7 @@
           <a:p>
             <a:fld id="{D28EE5FE-4A4D-DF46-9D59-49482504BE25}" type="datetimeFigureOut">
               <a:rPr lang="en-US" smtClean="0"/>
-              <a:t>9/18/18</a:t>
+              <a:t>1/2/26</a:t>
             </a:fld>
             <a:endParaRPr lang="en-US"/>
           </a:p>
@@ -665,7 +665,7 @@
           <a:p>
             <a:fld id="{D28EE5FE-4A4D-DF46-9D59-49482504BE25}" type="datetimeFigureOut">
               <a:rPr lang="en-US" smtClean="0"/>
-              <a:t>9/18/18</a:t>
+              <a:t>1/2/26</a:t>
             </a:fld>
             <a:endParaRPr lang="en-US"/>
           </a:p>
@@ -863,7 +863,7 @@
           <a:p>
             <a:fld id="{D28EE5FE-4A4D-DF46-9D59-49482504BE25}" type="datetimeFigureOut">
               <a:rPr lang="en-US" smtClean="0"/>
-              <a:t>9/18/18</a:t>
+              <a:t>1/2/26</a:t>
             </a:fld>
             <a:endParaRPr lang="en-US"/>
           </a:p>
@@ -1138,7 +1138,7 @@
           <a:p>
             <a:fld id="{D28EE5FE-4A4D-DF46-9D59-49482504BE25}" type="datetimeFigureOut">
               <a:rPr lang="en-US" smtClean="0"/>
-              <a:t>9/18/18</a:t>
+              <a:t>1/2/26</a:t>
             </a:fld>
             <a:endParaRPr lang="en-US"/>
           </a:p>
@@ -1403,7 +1403,7 @@
           <a:p>
             <a:fld id="{D28EE5FE-4A4D-DF46-9D59-49482504BE25}" type="datetimeFigureOut">
               <a:rPr lang="en-US" smtClean="0"/>
-              <a:t>9/18/18</a:t>
+              <a:t>1/2/26</a:t>
             </a:fld>
             <a:endParaRPr lang="en-US"/>
           </a:p>
@@ -1815,7 +1815,7 @@
           <a:p>
             <a:fld id="{D28EE5FE-4A4D-DF46-9D59-49482504BE25}" type="datetimeFigureOut">
               <a:rPr lang="en-US" smtClean="0"/>
-              <a:t>9/18/18</a:t>
+              <a:t>1/2/26</a:t>
             </a:fld>
             <a:endParaRPr lang="en-US"/>
           </a:p>
@@ -1956,7 +1956,7 @@
           <a:p>
             <a:fld id="{D28EE5FE-4A4D-DF46-9D59-49482504BE25}" type="datetimeFigureOut">
               <a:rPr lang="en-US" smtClean="0"/>
-              <a:t>9/18/18</a:t>
+              <a:t>1/2/26</a:t>
             </a:fld>
             <a:endParaRPr lang="en-US"/>
           </a:p>
@@ -2069,7 +2069,7 @@
           <a:p>
             <a:fld id="{D28EE5FE-4A4D-DF46-9D59-49482504BE25}" type="datetimeFigureOut">
               <a:rPr lang="en-US" smtClean="0"/>
-              <a:t>9/18/18</a:t>
+              <a:t>1/2/26</a:t>
             </a:fld>
             <a:endParaRPr lang="en-US"/>
           </a:p>
@@ -2380,7 +2380,7 @@
           <a:p>
             <a:fld id="{D28EE5FE-4A4D-DF46-9D59-49482504BE25}" type="datetimeFigureOut">
               <a:rPr lang="en-US" smtClean="0"/>
-              <a:t>9/18/18</a:t>
+              <a:t>1/2/26</a:t>
             </a:fld>
             <a:endParaRPr lang="en-US"/>
           </a:p>
@@ -2668,7 +2668,7 @@
           <a:p>
             <a:fld id="{D28EE5FE-4A4D-DF46-9D59-49482504BE25}" type="datetimeFigureOut">
               <a:rPr lang="en-US" smtClean="0"/>
-              <a:t>9/18/18</a:t>
+              <a:t>1/2/26</a:t>
             </a:fld>
             <a:endParaRPr lang="en-US"/>
           </a:p>
@@ -2909,7 +2909,7 @@
           <a:p>
             <a:fld id="{D28EE5FE-4A4D-DF46-9D59-49482504BE25}" type="datetimeFigureOut">
               <a:rPr lang="en-US" smtClean="0"/>
-              <a:t>9/18/18</a:t>
+              <a:t>1/2/26</a:t>
             </a:fld>
             <a:endParaRPr lang="en-US"/>
           </a:p>
@@ -3871,7 +3871,7 @@
         <p:spPr>
           <a:xfrm>
             <a:off x="0" y="-18279"/>
-            <a:ext cx="10619317" cy="369332"/>
+            <a:ext cx="10107960" cy="369332"/>
           </a:xfrm>
           <a:prstGeom prst="rect">
             <a:avLst/>
@@ -3886,7 +3886,7 @@
           <a:p>
             <a:r>
               <a:rPr lang="en-US" b="1" dirty="0"/>
-              <a:t>Spectrum1D </a:t>
+              <a:t>Spectrum </a:t>
             </a:r>
             <a:r>
               <a:rPr lang="en-US" dirty="0"/>

</xml_diff>